<commit_message>
Mapa del guion 11_01
</commit_message>
<xml_diff>
--- a/fuentes/contenidos/grado11/guion01/CN_11_01_CO.pptx
+++ b/fuentes/contenidos/grado11/guion01/CN_11_01_CO.pptx
@@ -405,7 +405,7 @@
           <a:p>
             <a:fld id="{5001C876-01F7-4317-94B9-1AE222133113}" type="datetimeFigureOut">
               <a:rPr lang="es-ES" smtClean="0"/>
-              <a:t>30/06/2016</a:t>
+              <a:t>03/07/2016</a:t>
             </a:fld>
             <a:endParaRPr lang="es-ES"/>
           </a:p>
@@ -1151,8 +1151,8 @@
           </a:fontRef>
         </p:style>
       </p:cxnSp>
-      <mc:AlternateContent xmlns:mc="http://schemas.openxmlformats.org/markup-compatibility/2006" xmlns:a14="http://schemas.microsoft.com/office/drawing/2010/main">
-        <mc:Choice Requires="a14">
+      <mc:AlternateContent xmlns:mc="http://schemas.openxmlformats.org/markup-compatibility/2006">
+        <mc:Choice xmlns:a14="http://schemas.microsoft.com/office/drawing/2010/main" Requires="a14">
           <p:sp>
             <p:nvSpPr>
               <p:cNvPr id="274" name="Rectángulo 273"/>
@@ -1174,7 +1174,7 @@
               </a:solidFill>
               <a:ln w="12700">
                 <a:solidFill>
-                  <a:schemeClr val="tx1"/>
+                  <a:srgbClr val="FF0000"/>
                 </a:solidFill>
               </a:ln>
             </p:spPr>
@@ -1290,7 +1290,7 @@
             </p:txBody>
           </p:sp>
         </mc:Choice>
-        <mc:Fallback xmlns="">
+        <mc:Fallback>
           <p:sp>
             <p:nvSpPr>
               <p:cNvPr id="274" name="Rectángulo 273"/>
@@ -1307,7 +1307,7 @@
               <a:prstGeom prst="rect">
                 <a:avLst/>
               </a:prstGeom>
-              <a:blipFill rotWithShape="0">
+              <a:blipFill>
                 <a:blip r:embed="rId2"/>
                 <a:stretch>
                   <a:fillRect/>
@@ -1315,7 +1315,7 @@
               </a:blipFill>
               <a:ln w="12700">
                 <a:solidFill>
-                  <a:schemeClr val="tx1"/>
+                  <a:srgbClr val="FF0000"/>
                 </a:solidFill>
               </a:ln>
             </p:spPr>
@@ -1693,7 +1693,11 @@
           <a:prstGeom prst="rect">
             <a:avLst/>
           </a:prstGeom>
-          <a:ln/>
+          <a:ln>
+            <a:solidFill>
+              <a:srgbClr val="FF0000"/>
+            </a:solidFill>
+          </a:ln>
         </p:spPr>
         <p:style>
           <a:lnRef idx="1">
@@ -1715,7 +1719,7 @@
           <a:p>
             <a:pPr algn="ctr"/>
             <a:r>
-              <a:rPr lang="es-CO" sz="900">
+              <a:rPr lang="es-CO" sz="900" dirty="0">
                 <a:solidFill>
                   <a:schemeClr val="bg1"/>
                 </a:solidFill>
@@ -1726,18 +1730,13 @@
           <a:p>
             <a:pPr algn="ctr"/>
             <a:r>
-              <a:rPr lang="es-CO" sz="900">
+              <a:rPr lang="es-CO" sz="900" dirty="0">
                 <a:solidFill>
                   <a:schemeClr val="bg1"/>
                 </a:solidFill>
               </a:rPr>
               <a:t>𝑣=𝜔𝐴∙𝑠𝑒𝑛⁡𝜔𝑡</a:t>
             </a:r>
-            <a:endParaRPr lang="es-CO" sz="900" dirty="0">
-              <a:solidFill>
-                <a:schemeClr val="bg1"/>
-              </a:solidFill>
-            </a:endParaRPr>
           </a:p>
         </p:txBody>
       </p:sp>
@@ -3026,7 +3025,11 @@
           <a:prstGeom prst="rect">
             <a:avLst/>
           </a:prstGeom>
-          <a:ln/>
+          <a:ln>
+            <a:solidFill>
+              <a:srgbClr val="FF0000"/>
+            </a:solidFill>
+          </a:ln>
         </p:spPr>
         <p:style>
           <a:lnRef idx="1">
@@ -3059,7 +3062,7 @@
           <a:p>
             <a:pPr algn="ctr"/>
             <a:r>
-              <a:rPr lang="es-CO" sz="900">
+              <a:rPr lang="es-CO" sz="900" dirty="0">
                 <a:solidFill>
                   <a:schemeClr val="bg1"/>
                 </a:solidFill>

</xml_diff>

<commit_message>
Cambio del mapa del 11_01
</commit_message>
<xml_diff>
--- a/fuentes/contenidos/grado11/guion01/CN_11_01_CO.pptx
+++ b/fuentes/contenidos/grado11/guion01/CN_11_01_CO.pptx
@@ -405,7 +405,7 @@
           <a:p>
             <a:fld id="{5001C876-01F7-4317-94B9-1AE222133113}" type="datetimeFigureOut">
               <a:rPr lang="es-ES" smtClean="0"/>
-              <a:t>22/07/2016</a:t>
+              <a:t>26/07/2016</a:t>
             </a:fld>
             <a:endParaRPr lang="es-ES"/>
           </a:p>
@@ -952,7 +952,7 @@
         </p:nvSpPr>
         <p:spPr>
           <a:xfrm>
-            <a:off x="2986575" y="88872"/>
+            <a:off x="2543984" y="192867"/>
             <a:ext cx="3516312" cy="453142"/>
           </a:xfrm>
           <a:prstGeom prst="rect">
@@ -963,7 +963,7 @@
           </a:solidFill>
           <a:ln>
             <a:solidFill>
-              <a:schemeClr val="tx1"/>
+              <a:srgbClr val="FF0000"/>
             </a:solidFill>
           </a:ln>
         </p:spPr>
@@ -988,7 +988,7 @@
             <a:pPr algn="ctr"/>
             <a:r>
               <a:rPr lang="es-CO" sz="1600" dirty="0"/>
-              <a:t>Fenómenos ondulatorios</a:t>
+              <a:t>Movimiento armónico simple</a:t>
             </a:r>
           </a:p>
         </p:txBody>
@@ -1026,7 +1026,7 @@
         </p:nvSpPr>
         <p:spPr>
           <a:xfrm>
-            <a:off x="2797685" y="1092922"/>
+            <a:off x="3346403" y="1133003"/>
             <a:ext cx="1056282" cy="439259"/>
           </a:xfrm>
           <a:prstGeom prst="rect">
@@ -1120,9 +1120,9 @@
           <p:nvPr/>
         </p:nvCxnSpPr>
         <p:spPr>
-          <a:xfrm flipH="1">
-            <a:off x="5025857" y="3768856"/>
-            <a:ext cx="46487" cy="293247"/>
+          <a:xfrm>
+            <a:off x="5072344" y="3768856"/>
+            <a:ext cx="0" cy="310402"/>
           </a:xfrm>
           <a:prstGeom prst="line">
             <a:avLst/>
@@ -1148,8 +1148,8 @@
           </a:fontRef>
         </p:style>
       </p:cxnSp>
-      <mc:AlternateContent xmlns:mc="http://schemas.openxmlformats.org/markup-compatibility/2006" xmlns:a14="http://schemas.microsoft.com/office/drawing/2010/main">
-        <mc:Choice Requires="a14">
+      <mc:AlternateContent xmlns:mc="http://schemas.openxmlformats.org/markup-compatibility/2006">
+        <mc:Choice xmlns:a14="http://schemas.microsoft.com/office/drawing/2010/main" Requires="a14">
           <p:sp>
             <p:nvSpPr>
               <p:cNvPr id="274" name="Rectángulo 273"/>
@@ -1158,7 +1158,7 @@
             </p:nvSpPr>
             <p:spPr>
               <a:xfrm>
-                <a:off x="5675650" y="2166045"/>
+                <a:off x="5916549" y="2506256"/>
                 <a:ext cx="964812" cy="512399"/>
               </a:xfrm>
               <a:prstGeom prst="rect">
@@ -1287,7 +1287,7 @@
             </p:txBody>
           </p:sp>
         </mc:Choice>
-        <mc:Fallback xmlns="">
+        <mc:Fallback>
           <p:sp>
             <p:nvSpPr>
               <p:cNvPr id="274" name="Rectángulo 273"/>
@@ -1298,7 +1298,7 @@
             </p:nvSpPr>
             <p:spPr>
               <a:xfrm>
-                <a:off x="5675650" y="2166045"/>
+                <a:off x="5916549" y="2506256"/>
                 <a:ext cx="964812" cy="512399"/>
               </a:xfrm>
               <a:prstGeom prst="rect">
@@ -1335,15 +1335,15 @@
         <p:nvCxnSpPr>
           <p:cNvPr id="163" name="Conector angular 162"/>
           <p:cNvCxnSpPr>
-            <a:stCxn id="3" idx="2"/>
+            <a:stCxn id="4" idx="2"/>
             <a:endCxn id="22" idx="0"/>
           </p:cNvCxnSpPr>
           <p:nvPr/>
         </p:nvCxnSpPr>
         <p:spPr>
           <a:xfrm rot="5400000">
-            <a:off x="3733962" y="432377"/>
-            <a:ext cx="252409" cy="1068680"/>
+            <a:off x="3844845" y="675708"/>
+            <a:ext cx="486994" cy="427596"/>
           </a:xfrm>
           <a:prstGeom prst="bentConnector3">
             <a:avLst>
@@ -1371,67 +1371,184 @@
           </a:fontRef>
         </p:style>
       </p:cxnSp>
-      <p:sp>
-        <p:nvSpPr>
-          <p:cNvPr id="134" name="Rectángulo 71"/>
-          <p:cNvSpPr/>
-          <p:nvPr/>
-        </p:nvSpPr>
-        <p:spPr>
-          <a:xfrm>
-            <a:off x="3893485" y="4870768"/>
-            <a:ext cx="1041607" cy="528910"/>
-          </a:xfrm>
-          <a:prstGeom prst="rect">
-            <a:avLst/>
-          </a:prstGeom>
-          <a:ln>
-            <a:solidFill>
-              <a:srgbClr val="FF0000"/>
-            </a:solidFill>
-          </a:ln>
-        </p:spPr>
-        <p:style>
-          <a:lnRef idx="2">
-            <a:schemeClr val="dk1"/>
-          </a:lnRef>
-          <a:fillRef idx="1">
-            <a:schemeClr val="lt1"/>
-          </a:fillRef>
-          <a:effectRef idx="0">
-            <a:schemeClr val="dk1"/>
-          </a:effectRef>
-          <a:fontRef idx="minor">
-            <a:schemeClr val="dk1"/>
-          </a:fontRef>
-        </p:style>
-        <p:txBody>
-          <a:bodyPr rtlCol="0" anchor="ctr"/>
-          <a:lstStyle/>
-          <a:p>
-            <a:pPr algn="ctr"/>
-            <a:r>
-              <a:rPr lang="es-CO" sz="900" dirty="0">
+      <mc:AlternateContent xmlns:mc="http://schemas.openxmlformats.org/markup-compatibility/2006">
+        <mc:Choice xmlns:a14="http://schemas.microsoft.com/office/drawing/2010/main" Requires="a14">
+          <p:sp>
+            <p:nvSpPr>
+              <p:cNvPr id="134" name="Rectángulo 71"/>
+              <p:cNvSpPr/>
+              <p:nvPr/>
+            </p:nvSpPr>
+            <p:spPr>
+              <a:xfrm>
+                <a:off x="4007789" y="4870768"/>
+                <a:ext cx="1041607" cy="528910"/>
+              </a:xfrm>
+              <a:prstGeom prst="rect">
+                <a:avLst/>
+              </a:prstGeom>
+              <a:ln>
                 <a:solidFill>
-                  <a:schemeClr val="tx1"/>
+                  <a:srgbClr val="FF0000"/>
                 </a:solidFill>
-              </a:rPr>
-              <a:t>energía cinética</a:t>
-            </a:r>
-          </a:p>
-          <a:p>
-            <a:pPr algn="ctr"/>
-            <a:r>
-              <a:rPr lang="es-CO" sz="900" dirty="0">
+              </a:ln>
+            </p:spPr>
+            <p:style>
+              <a:lnRef idx="2">
+                <a:schemeClr val="dk1"/>
+              </a:lnRef>
+              <a:fillRef idx="1">
+                <a:schemeClr val="lt1"/>
+              </a:fillRef>
+              <a:effectRef idx="0">
+                <a:schemeClr val="dk1"/>
+              </a:effectRef>
+              <a:fontRef idx="minor">
+                <a:schemeClr val="dk1"/>
+              </a:fontRef>
+            </p:style>
+            <p:txBody>
+              <a:bodyPr rtlCol="0" anchor="ctr"/>
+              <a:lstStyle/>
+              <a:p>
+                <a:pPr algn="ctr"/>
+                <a:r>
+                  <a:rPr lang="es-CO" sz="900" dirty="0">
+                    <a:solidFill>
+                      <a:schemeClr val="tx1"/>
+                    </a:solidFill>
+                  </a:rPr>
+                  <a:t>energía cinética</a:t>
+                </a:r>
+              </a:p>
+              <a:p>
+                <a:pPr algn="ctr"/>
+                <a:r>
+                  <a:rPr lang="es-CO" sz="900" dirty="0">
+                    <a:solidFill>
+                      <a:schemeClr val="tx1"/>
+                    </a:solidFill>
+                  </a:rPr>
+                  <a:t>𝐸</a:t>
+                </a:r>
+                <a:r>
+                  <a:rPr lang="es-CO" sz="1050" baseline="-25000" dirty="0">
+                    <a:solidFill>
+                      <a:schemeClr val="tx1"/>
+                    </a:solidFill>
+                  </a:rPr>
+                  <a:t>𝑐 </a:t>
+                </a:r>
+                <a:r>
+                  <a:rPr lang="es-CO" sz="900" dirty="0">
+                    <a:solidFill>
+                      <a:schemeClr val="tx1"/>
+                    </a:solidFill>
+                  </a:rPr>
+                  <a:t>= </a:t>
+                </a:r>
+                <a14:m>
+                  <m:oMath xmlns:m="http://schemas.openxmlformats.org/officeDocument/2006/math">
+                    <m:f>
+                      <m:fPr>
+                        <m:ctrlPr>
+                          <a:rPr lang="es-CO" sz="900" i="1" dirty="0" smtClean="0">
+                            <a:solidFill>
+                              <a:schemeClr val="tx1"/>
+                            </a:solidFill>
+                            <a:latin typeface="Cambria Math" panose="02040503050406030204" pitchFamily="18" charset="0"/>
+                          </a:rPr>
+                        </m:ctrlPr>
+                      </m:fPr>
+                      <m:num>
+                        <m:r>
+                          <a:rPr lang="es-CO" sz="900" b="0" i="1" dirty="0" smtClean="0">
+                            <a:solidFill>
+                              <a:schemeClr val="tx1"/>
+                            </a:solidFill>
+                            <a:latin typeface="Cambria Math" panose="02040503050406030204" pitchFamily="18" charset="0"/>
+                          </a:rPr>
+                          <m:t>1</m:t>
+                        </m:r>
+                      </m:num>
+                      <m:den>
+                        <m:r>
+                          <a:rPr lang="es-CO" sz="900" b="0" i="1" dirty="0" smtClean="0">
+                            <a:solidFill>
+                              <a:schemeClr val="tx1"/>
+                            </a:solidFill>
+                            <a:latin typeface="Cambria Math" panose="02040503050406030204" pitchFamily="18" charset="0"/>
+                          </a:rPr>
+                          <m:t>2</m:t>
+                        </m:r>
+                      </m:den>
+                    </m:f>
+                  </m:oMath>
+                </a14:m>
+                <a:r>
+                  <a:rPr lang="es-CO" sz="900" dirty="0">
+                    <a:solidFill>
+                      <a:schemeClr val="tx1"/>
+                    </a:solidFill>
+                  </a:rPr>
+                  <a:t> 𝑚𝑣</a:t>
+                </a:r>
+                <a:r>
+                  <a:rPr lang="es-CO" sz="900" baseline="30000" dirty="0">
+                    <a:solidFill>
+                      <a:schemeClr val="tx1"/>
+                    </a:solidFill>
+                  </a:rPr>
+                  <a:t>2</a:t>
+                </a:r>
+              </a:p>
+            </p:txBody>
+          </p:sp>
+        </mc:Choice>
+        <mc:Fallback>
+          <p:sp>
+            <p:nvSpPr>
+              <p:cNvPr id="134" name="Rectángulo 71"/>
+              <p:cNvSpPr>
+                <a:spLocks noRot="1" noChangeAspect="1" noMove="1" noResize="1" noEditPoints="1" noAdjustHandles="1" noChangeArrowheads="1" noChangeShapeType="1" noTextEdit="1"/>
+              </p:cNvSpPr>
+              <p:nvPr/>
+            </p:nvSpPr>
+            <p:spPr>
+              <a:xfrm>
+                <a:off x="4007789" y="4870768"/>
+                <a:ext cx="1041607" cy="528910"/>
+              </a:xfrm>
+              <a:prstGeom prst="rect">
+                <a:avLst/>
+              </a:prstGeom>
+              <a:blipFill>
+                <a:blip r:embed="rId3"/>
+                <a:stretch>
+                  <a:fillRect/>
+                </a:stretch>
+              </a:blipFill>
+              <a:ln>
                 <a:solidFill>
-                  <a:schemeClr val="tx1"/>
+                  <a:srgbClr val="FF0000"/>
                 </a:solidFill>
-              </a:rPr>
-              <a:t>𝐸𝑐=1/2 𝑚𝑣^2</a:t>
-            </a:r>
-          </a:p>
-        </p:txBody>
-      </p:sp>
+              </a:ln>
+            </p:spPr>
+            <p:txBody>
+              <a:bodyPr/>
+              <a:lstStyle/>
+              <a:p>
+                <a:r>
+                  <a:rPr lang="es-CO">
+                    <a:noFill/>
+                  </a:rPr>
+                  <a:t> </a:t>
+                </a:r>
+              </a:p>
+            </p:txBody>
+          </p:sp>
+        </mc:Fallback>
+      </mc:AlternateContent>
       <p:sp>
         <p:nvSpPr>
           <p:cNvPr id="135" name="Rectángulo 71"/>
@@ -1549,17 +1666,17 @@
       </p:sp>
       <p:cxnSp>
         <p:nvCxnSpPr>
-          <p:cNvPr id="71" name="Conector recto 70"/>
+          <p:cNvPr id="94" name="Conector recto 93"/>
           <p:cNvCxnSpPr>
-            <a:stCxn id="4" idx="2"/>
-            <a:endCxn id="3" idx="0"/>
+            <a:stCxn id="135" idx="2"/>
+            <a:endCxn id="506" idx="0"/>
           </p:cNvCxnSpPr>
           <p:nvPr/>
         </p:nvCxnSpPr>
         <p:spPr>
           <a:xfrm flipH="1">
-            <a:off x="4394506" y="542014"/>
-            <a:ext cx="350225" cy="67667"/>
+            <a:off x="2619757" y="3924177"/>
+            <a:ext cx="1761" cy="204210"/>
           </a:xfrm>
           <a:prstGeom prst="line">
             <a:avLst/>
@@ -1585,97 +1702,168 @@
           </a:fontRef>
         </p:style>
       </p:cxnSp>
-      <p:cxnSp>
-        <p:nvCxnSpPr>
-          <p:cNvPr id="94" name="Conector recto 93"/>
-          <p:cNvCxnSpPr>
-            <a:stCxn id="135" idx="2"/>
-            <a:endCxn id="506" idx="0"/>
-          </p:cNvCxnSpPr>
-          <p:nvPr/>
-        </p:nvCxnSpPr>
-        <p:spPr>
-          <a:xfrm flipH="1">
-            <a:off x="2619757" y="3924177"/>
-            <a:ext cx="1761" cy="204210"/>
-          </a:xfrm>
-          <a:prstGeom prst="line">
-            <a:avLst/>
-          </a:prstGeom>
-          <a:ln w="12700">
-            <a:solidFill>
-              <a:schemeClr val="tx1"/>
-            </a:solidFill>
-          </a:ln>
-        </p:spPr>
-        <p:style>
-          <a:lnRef idx="1">
-            <a:schemeClr val="accent1"/>
-          </a:lnRef>
-          <a:fillRef idx="0">
-            <a:schemeClr val="accent1"/>
-          </a:fillRef>
-          <a:effectRef idx="0">
-            <a:schemeClr val="accent1"/>
-          </a:effectRef>
-          <a:fontRef idx="minor">
-            <a:schemeClr val="tx1"/>
-          </a:fontRef>
-        </p:style>
-      </p:cxnSp>
-      <p:sp>
-        <p:nvSpPr>
-          <p:cNvPr id="143" name="Rectángulo 142"/>
-          <p:cNvSpPr/>
-          <p:nvPr/>
-        </p:nvSpPr>
-        <p:spPr>
-          <a:xfrm>
-            <a:off x="5114696" y="5940912"/>
-            <a:ext cx="1027420" cy="629357"/>
-          </a:xfrm>
-          <a:prstGeom prst="rect">
-            <a:avLst/>
-          </a:prstGeom>
-          <a:ln>
-            <a:solidFill>
-              <a:srgbClr val="FF0000"/>
-            </a:solidFill>
-          </a:ln>
-        </p:spPr>
-        <p:style>
-          <a:lnRef idx="2">
-            <a:schemeClr val="dk1"/>
-          </a:lnRef>
-          <a:fillRef idx="1">
-            <a:schemeClr val="lt1"/>
-          </a:fillRef>
-          <a:effectRef idx="0">
-            <a:schemeClr val="dk1"/>
-          </a:effectRef>
-          <a:fontRef idx="minor">
-            <a:schemeClr val="dk1"/>
-          </a:fontRef>
-        </p:style>
-        <p:txBody>
-          <a:bodyPr rtlCol="0" anchor="ctr"/>
-          <a:lstStyle/>
-          <a:p>
-            <a:pPr algn="ctr"/>
-            <a:r>
-              <a:rPr lang="es-CO" sz="900" dirty="0"/>
-              <a:t>elástica</a:t>
-            </a:r>
-          </a:p>
-          <a:p>
-            <a:pPr algn="ctr"/>
-            <a:r>
-              <a:rPr lang="es-CO" sz="900" dirty="0"/>
-              <a:t>𝐸(𝑃𝑒 )=1/2 𝑘𝑥^2</a:t>
-            </a:r>
-          </a:p>
-        </p:txBody>
-      </p:sp>
+      <mc:AlternateContent xmlns:mc="http://schemas.openxmlformats.org/markup-compatibility/2006">
+        <mc:Choice xmlns:a14="http://schemas.microsoft.com/office/drawing/2010/main" Requires="a14">
+          <p:sp>
+            <p:nvSpPr>
+              <p:cNvPr id="143" name="Rectángulo 142"/>
+              <p:cNvSpPr/>
+              <p:nvPr/>
+            </p:nvSpPr>
+            <p:spPr>
+              <a:xfrm>
+                <a:off x="5229000" y="5940912"/>
+                <a:ext cx="1027420" cy="629357"/>
+              </a:xfrm>
+              <a:prstGeom prst="rect">
+                <a:avLst/>
+              </a:prstGeom>
+              <a:ln>
+                <a:solidFill>
+                  <a:srgbClr val="FF0000"/>
+                </a:solidFill>
+              </a:ln>
+            </p:spPr>
+            <p:style>
+              <a:lnRef idx="2">
+                <a:schemeClr val="dk1"/>
+              </a:lnRef>
+              <a:fillRef idx="1">
+                <a:schemeClr val="lt1"/>
+              </a:fillRef>
+              <a:effectRef idx="0">
+                <a:schemeClr val="dk1"/>
+              </a:effectRef>
+              <a:fontRef idx="minor">
+                <a:schemeClr val="dk1"/>
+              </a:fontRef>
+            </p:style>
+            <p:txBody>
+              <a:bodyPr rtlCol="0" anchor="ctr"/>
+              <a:lstStyle/>
+              <a:p>
+                <a:pPr algn="ctr"/>
+                <a:r>
+                  <a:rPr lang="es-CO" sz="900" dirty="0"/>
+                  <a:t>elástica</a:t>
+                </a:r>
+              </a:p>
+              <a:p>
+                <a:pPr algn="ctr"/>
+                <a:r>
+                  <a:rPr lang="es-CO" sz="900" dirty="0"/>
+                  <a:t>𝐸</a:t>
+                </a:r>
+                <a:r>
+                  <a:rPr lang="es-CO" sz="900" baseline="-25000" dirty="0"/>
+                  <a:t>𝑃𝑒 </a:t>
+                </a:r>
+                <a:r>
+                  <a:rPr lang="es-CO" sz="900" dirty="0"/>
+                  <a:t>=</a:t>
+                </a:r>
+                <a:r>
+                  <a:rPr lang="es-CO" sz="900" dirty="0">
+                    <a:solidFill>
+                      <a:schemeClr val="tx1"/>
+                    </a:solidFill>
+                  </a:rPr>
+                  <a:t> </a:t>
+                </a:r>
+                <a14:m>
+                  <m:oMath xmlns:m="http://schemas.openxmlformats.org/officeDocument/2006/math">
+                    <m:f>
+                      <m:fPr>
+                        <m:ctrlPr>
+                          <a:rPr lang="es-CO" sz="900" i="1" dirty="0">
+                            <a:solidFill>
+                              <a:schemeClr val="tx1"/>
+                            </a:solidFill>
+                            <a:latin typeface="Cambria Math" panose="02040503050406030204" pitchFamily="18" charset="0"/>
+                          </a:rPr>
+                        </m:ctrlPr>
+                      </m:fPr>
+                      <m:num>
+                        <m:r>
+                          <a:rPr lang="es-CO" sz="900" i="1" dirty="0">
+                            <a:solidFill>
+                              <a:schemeClr val="tx1"/>
+                            </a:solidFill>
+                            <a:latin typeface="Cambria Math" panose="02040503050406030204" pitchFamily="18" charset="0"/>
+                          </a:rPr>
+                          <m:t>1</m:t>
+                        </m:r>
+                      </m:num>
+                      <m:den>
+                        <m:r>
+                          <a:rPr lang="es-CO" sz="900" i="1" dirty="0">
+                            <a:solidFill>
+                              <a:schemeClr val="tx1"/>
+                            </a:solidFill>
+                            <a:latin typeface="Cambria Math" panose="02040503050406030204" pitchFamily="18" charset="0"/>
+                          </a:rPr>
+                          <m:t>2</m:t>
+                        </m:r>
+                      </m:den>
+                    </m:f>
+                  </m:oMath>
+                </a14:m>
+                <a:r>
+                  <a:rPr lang="es-CO" sz="900" dirty="0"/>
+                  <a:t> 𝑘𝑥</a:t>
+                </a:r>
+                <a:r>
+                  <a:rPr lang="es-CO" sz="900" baseline="30000" dirty="0"/>
+                  <a:t>2</a:t>
+                </a:r>
+              </a:p>
+            </p:txBody>
+          </p:sp>
+        </mc:Choice>
+        <mc:Fallback>
+          <p:sp>
+            <p:nvSpPr>
+              <p:cNvPr id="143" name="Rectángulo 142"/>
+              <p:cNvSpPr>
+                <a:spLocks noRot="1" noChangeAspect="1" noMove="1" noResize="1" noEditPoints="1" noAdjustHandles="1" noChangeArrowheads="1" noChangeShapeType="1" noTextEdit="1"/>
+              </p:cNvSpPr>
+              <p:nvPr/>
+            </p:nvSpPr>
+            <p:spPr>
+              <a:xfrm>
+                <a:off x="5229000" y="5940912"/>
+                <a:ext cx="1027420" cy="629357"/>
+              </a:xfrm>
+              <a:prstGeom prst="rect">
+                <a:avLst/>
+              </a:prstGeom>
+              <a:blipFill>
+                <a:blip r:embed="rId4"/>
+                <a:stretch>
+                  <a:fillRect/>
+                </a:stretch>
+              </a:blipFill>
+              <a:ln>
+                <a:solidFill>
+                  <a:srgbClr val="FF0000"/>
+                </a:solidFill>
+              </a:ln>
+            </p:spPr>
+            <p:txBody>
+              <a:bodyPr/>
+              <a:lstStyle/>
+              <a:p>
+                <a:r>
+                  <a:rPr lang="es-CO">
+                    <a:noFill/>
+                  </a:rPr>
+                  <a:t> </a:t>
+                </a:r>
+              </a:p>
+            </p:txBody>
+          </p:sp>
+        </mc:Fallback>
+      </mc:AlternateContent>
       <p:sp>
         <p:nvSpPr>
           <p:cNvPr id="166" name="Rectángulo 165"/>
@@ -1684,7 +1872,7 @@
         </p:nvSpPr>
         <p:spPr>
           <a:xfrm>
-            <a:off x="6748327" y="2155599"/>
+            <a:off x="6766367" y="3270316"/>
             <a:ext cx="920569" cy="462239"/>
           </a:xfrm>
           <a:prstGeom prst="rect">
@@ -1732,7 +1920,7 @@
                   <a:schemeClr val="bg1"/>
                 </a:solidFill>
               </a:rPr>
-              <a:t>𝑣=𝜔𝐴∙𝑠𝑒𝑛⁡𝜔𝑡</a:t>
+              <a:t>𝑣 = 𝜔𝐴∙𝑠𝑒𝑛⁡𝜔𝑡</a:t>
             </a:r>
           </a:p>
         </p:txBody>
@@ -1783,7 +1971,19 @@
             <a:pPr algn="ctr"/>
             <a:r>
               <a:rPr lang="es-CO" sz="900" dirty="0"/>
-              <a:t>𝐸=𝐸𝑝+𝐸𝑐</a:t>
+              <a:t>𝐸=𝐸</a:t>
+            </a:r>
+            <a:r>
+              <a:rPr lang="es-CO" sz="900" baseline="-25000" dirty="0"/>
+              <a:t>𝑝</a:t>
+            </a:r>
+            <a:r>
+              <a:rPr lang="es-CO" sz="900" dirty="0"/>
+              <a:t>+𝐸</a:t>
+            </a:r>
+            <a:r>
+              <a:rPr lang="es-CO" sz="900" baseline="-25000" dirty="0"/>
+              <a:t>𝑐</a:t>
             </a:r>
           </a:p>
         </p:txBody>
@@ -1798,9 +1998,9 @@
           <p:nvPr/>
         </p:nvCxnSpPr>
         <p:spPr>
-          <a:xfrm>
-            <a:off x="2016316" y="5355392"/>
-            <a:ext cx="69157" cy="368696"/>
+          <a:xfrm flipH="1">
+            <a:off x="2016315" y="5355392"/>
+            <a:ext cx="1" cy="275491"/>
           </a:xfrm>
           <a:prstGeom prst="line">
             <a:avLst/>
@@ -1837,8 +2037,8 @@
         </p:nvCxnSpPr>
         <p:spPr>
           <a:xfrm flipH="1">
-            <a:off x="5072346" y="2803887"/>
-            <a:ext cx="2" cy="156206"/>
+            <a:off x="5072346" y="2761604"/>
+            <a:ext cx="7190" cy="198489"/>
           </a:xfrm>
           <a:prstGeom prst="line">
             <a:avLst/>
@@ -1872,7 +2072,7 @@
         </p:nvSpPr>
         <p:spPr>
           <a:xfrm>
-            <a:off x="4626935" y="2176076"/>
+            <a:off x="4634123" y="2133793"/>
             <a:ext cx="890825" cy="627811"/>
           </a:xfrm>
           <a:prstGeom prst="rect">
@@ -1885,7 +2085,7 @@
           </a:solidFill>
           <a:ln w="12700">
             <a:solidFill>
-              <a:schemeClr val="tx1"/>
+              <a:srgbClr val="FF0000"/>
             </a:solidFill>
           </a:ln>
         </p:spPr>
@@ -1914,7 +2114,7 @@
                   <a:schemeClr val="bg1"/>
                 </a:solidFill>
               </a:rPr>
-              <a:t>la energía mecánica</a:t>
+              <a:t>energía mecánica</a:t>
             </a:r>
           </a:p>
         </p:txBody>
@@ -2035,8 +2235,8 @@
         </p:nvCxnSpPr>
         <p:spPr>
           <a:xfrm flipH="1">
-            <a:off x="5072348" y="1967228"/>
-            <a:ext cx="5127" cy="208848"/>
+            <a:off x="5079536" y="2019025"/>
+            <a:ext cx="39465" cy="114768"/>
           </a:xfrm>
           <a:prstGeom prst="line">
             <a:avLst/>
@@ -2111,7 +2311,7 @@
         </p:nvCxnSpPr>
         <p:spPr>
           <a:xfrm>
-            <a:off x="6119659" y="5399678"/>
+            <a:off x="6233963" y="5399678"/>
             <a:ext cx="4015" cy="157820"/>
           </a:xfrm>
           <a:prstGeom prst="line">
@@ -2291,8 +2491,8 @@
         </p:nvCxnSpPr>
         <p:spPr>
           <a:xfrm rot="5400000">
-            <a:off x="6497895" y="1625184"/>
-            <a:ext cx="201022" cy="880700"/>
+            <a:off x="6601770" y="1904916"/>
+            <a:ext cx="398525" cy="804154"/>
           </a:xfrm>
           <a:prstGeom prst="bentConnector3">
             <a:avLst>
@@ -2331,8 +2531,8 @@
         </p:nvCxnSpPr>
         <p:spPr>
           <a:xfrm rot="16200000" flipH="1">
-            <a:off x="7028396" y="1975383"/>
-            <a:ext cx="190576" cy="169856"/>
+            <a:off x="6633588" y="2677251"/>
+            <a:ext cx="1162585" cy="23543"/>
           </a:xfrm>
           <a:prstGeom prst="bentConnector3">
             <a:avLst>
@@ -2368,7 +2568,7 @@
         </p:nvSpPr>
         <p:spPr>
           <a:xfrm>
-            <a:off x="6709810" y="1081663"/>
+            <a:off x="6748327" y="1148602"/>
             <a:ext cx="909564" cy="415630"/>
           </a:xfrm>
           <a:prstGeom prst="rect">
@@ -2407,10 +2607,9 @@
           <a:p>
             <a:pPr algn="ctr"/>
             <a:r>
-              <a:rPr lang="es-CO" sz="1050" b="1"/>
+              <a:rPr lang="es-CO" sz="1050" b="1" dirty="0"/>
               <a:t>Cinemática</a:t>
             </a:r>
-            <a:endParaRPr lang="es-CO" sz="1050" b="1" dirty="0"/>
           </a:p>
         </p:txBody>
       </p:sp>
@@ -2471,15 +2670,15 @@
         <p:nvCxnSpPr>
           <p:cNvPr id="118" name="Conector angular 117"/>
           <p:cNvCxnSpPr>
-            <a:stCxn id="3" idx="2"/>
+            <a:stCxn id="4" idx="2"/>
             <a:endCxn id="116" idx="0"/>
           </p:cNvCxnSpPr>
           <p:nvPr/>
         </p:nvCxnSpPr>
         <p:spPr>
           <a:xfrm rot="16200000" flipH="1">
-            <a:off x="5658974" y="-423955"/>
-            <a:ext cx="241150" cy="2770086"/>
+            <a:off x="5501328" y="-553180"/>
+            <a:ext cx="502593" cy="2900969"/>
           </a:xfrm>
           <a:prstGeom prst="bentConnector3">
             <a:avLst>
@@ -2511,15 +2710,15 @@
         <p:nvCxnSpPr>
           <p:cNvPr id="150" name="Conector angular 149"/>
           <p:cNvCxnSpPr>
-            <a:stCxn id="3" idx="2"/>
+            <a:stCxn id="4" idx="2"/>
             <a:endCxn id="117" idx="0"/>
           </p:cNvCxnSpPr>
           <p:nvPr/>
         </p:nvCxnSpPr>
         <p:spPr>
           <a:xfrm rot="5400000">
-            <a:off x="2651531" y="-613540"/>
-            <a:ext cx="288923" cy="3197029"/>
+            <a:off x="2508096" y="-664609"/>
+            <a:ext cx="483427" cy="3104663"/>
           </a:xfrm>
           <a:prstGeom prst="bentConnector3">
             <a:avLst>
@@ -2583,8 +2782,8 @@
         </p:nvSpPr>
         <p:spPr>
           <a:xfrm>
-            <a:off x="4573170" y="1736396"/>
-            <a:ext cx="1008609" cy="230832"/>
+            <a:off x="4571415" y="1788193"/>
+            <a:ext cx="1095172" cy="230832"/>
           </a:xfrm>
           <a:prstGeom prst="rect">
             <a:avLst/>
@@ -2597,10 +2796,9 @@
           <a:lstStyle/>
           <a:p>
             <a:r>
-              <a:rPr lang="es-CO" sz="900"/>
-              <a:t>en el se conserva</a:t>
+              <a:rPr lang="es-CO" sz="900" dirty="0"/>
+              <a:t>en el se conserva la</a:t>
             </a:r>
-            <a:endParaRPr lang="es-CO" sz="900" dirty="0"/>
           </a:p>
         </p:txBody>
       </p:sp>
@@ -2612,7 +2810,7 @@
         </p:nvSpPr>
         <p:spPr>
           <a:xfrm>
-            <a:off x="6660287" y="1734191"/>
+            <a:off x="6824640" y="1876899"/>
             <a:ext cx="756938" cy="230832"/>
           </a:xfrm>
           <a:prstGeom prst="rect">
@@ -2626,12 +2824,8 @@
           <a:lstStyle/>
           <a:p>
             <a:r>
-              <a:rPr lang="es-CO" sz="900"/>
-              <a:t>definida </a:t>
-            </a:r>
-            <a:r>
               <a:rPr lang="es-CO" sz="900" dirty="0"/>
-              <a:t>por</a:t>
+              <a:t>definida por</a:t>
             </a:r>
           </a:p>
         </p:txBody>
@@ -2646,9 +2840,9 @@
           <p:nvPr/>
         </p:nvCxnSpPr>
         <p:spPr>
-          <a:xfrm flipH="1">
-            <a:off x="7038756" y="1497293"/>
-            <a:ext cx="125836" cy="236898"/>
+          <a:xfrm>
+            <a:off x="7203109" y="1564232"/>
+            <a:ext cx="0" cy="312667"/>
           </a:xfrm>
           <a:prstGeom prst="line">
             <a:avLst/>
@@ -2710,7 +2904,7 @@
         </p:nvSpPr>
         <p:spPr>
           <a:xfrm>
-            <a:off x="4687463" y="4062103"/>
+            <a:off x="4733950" y="4079258"/>
             <a:ext cx="676788" cy="230832"/>
           </a:xfrm>
           <a:prstGeom prst="rect">
@@ -2819,8 +3013,8 @@
         </p:nvCxnSpPr>
         <p:spPr>
           <a:xfrm rot="16200000" flipH="1">
-            <a:off x="7632226" y="1371553"/>
-            <a:ext cx="174352" cy="1361292"/>
+            <a:off x="7467425" y="1843415"/>
+            <a:ext cx="373426" cy="902058"/>
           </a:xfrm>
           <a:prstGeom prst="bentConnector3">
             <a:avLst>
@@ -2939,12 +3133,12 @@
         </p:nvCxnSpPr>
         <p:spPr>
           <a:xfrm rot="16200000" flipH="1">
-            <a:off x="4099543" y="758463"/>
-            <a:ext cx="204215" cy="1751649"/>
+            <a:off x="4388807" y="1057998"/>
+            <a:ext cx="215931" cy="1244457"/>
           </a:xfrm>
           <a:prstGeom prst="bentConnector3">
             <a:avLst>
-              <a:gd name="adj1" fmla="val 60413"/>
+              <a:gd name="adj1" fmla="val 50000"/>
             </a:avLst>
           </a:prstGeom>
           <a:ln w="12700">
@@ -2979,8 +3173,8 @@
         </p:nvCxnSpPr>
         <p:spPr>
           <a:xfrm rot="5400000">
-            <a:off x="2846633" y="1308086"/>
-            <a:ext cx="255099" cy="703288"/>
+            <a:off x="3141032" y="1053768"/>
+            <a:ext cx="215018" cy="1252006"/>
           </a:xfrm>
           <a:prstGeom prst="bentConnector3">
             <a:avLst>
@@ -3008,80 +3202,231 @@
           </a:fontRef>
         </p:style>
       </p:cxnSp>
-      <p:sp>
-        <p:nvSpPr>
-          <p:cNvPr id="141" name="Rectángulo 140"/>
-          <p:cNvSpPr/>
-          <p:nvPr/>
-        </p:nvSpPr>
-        <p:spPr>
-          <a:xfrm>
-            <a:off x="7776761" y="2139375"/>
-            <a:ext cx="1246573" cy="562595"/>
-          </a:xfrm>
-          <a:prstGeom prst="rect">
-            <a:avLst/>
-          </a:prstGeom>
-          <a:ln>
-            <a:solidFill>
-              <a:srgbClr val="FF0000"/>
-            </a:solidFill>
-          </a:ln>
-        </p:spPr>
-        <p:style>
-          <a:lnRef idx="1">
-            <a:schemeClr val="dk1"/>
-          </a:lnRef>
-          <a:fillRef idx="2">
-            <a:schemeClr val="dk1"/>
-          </a:fillRef>
-          <a:effectRef idx="1">
-            <a:schemeClr val="dk1"/>
-          </a:effectRef>
-          <a:fontRef idx="minor">
-            <a:schemeClr val="dk1"/>
-          </a:fontRef>
-        </p:style>
-        <p:txBody>
-          <a:bodyPr rtlCol="0" anchor="ctr"/>
-          <a:lstStyle/>
-          <a:p>
-            <a:pPr algn="ctr"/>
-            <a:r>
-              <a:rPr lang="es-CO" sz="900">
+      <mc:AlternateContent xmlns:mc="http://schemas.openxmlformats.org/markup-compatibility/2006">
+        <mc:Choice xmlns:a14="http://schemas.microsoft.com/office/drawing/2010/main" Requires="a14">
+          <p:sp>
+            <p:nvSpPr>
+              <p:cNvPr id="141" name="Rectángulo 140"/>
+              <p:cNvSpPr/>
+              <p:nvPr/>
+            </p:nvSpPr>
+            <p:spPr>
+              <a:xfrm>
+                <a:off x="7481880" y="2481157"/>
+                <a:ext cx="1246573" cy="562595"/>
+              </a:xfrm>
+              <a:prstGeom prst="rect">
+                <a:avLst/>
+              </a:prstGeom>
+              <a:ln>
                 <a:solidFill>
-                  <a:schemeClr val="bg1"/>
+                  <a:srgbClr val="FF0000"/>
                 </a:solidFill>
-              </a:rPr>
-              <a:t>a</a:t>
-            </a:r>
-            <a:r>
-              <a:rPr lang="es-CO" sz="900" smtClean="0">
+              </a:ln>
+            </p:spPr>
+            <p:style>
+              <a:lnRef idx="1">
+                <a:schemeClr val="dk1"/>
+              </a:lnRef>
+              <a:fillRef idx="2">
+                <a:schemeClr val="dk1"/>
+              </a:fillRef>
+              <a:effectRef idx="1">
+                <a:schemeClr val="dk1"/>
+              </a:effectRef>
+              <a:fontRef idx="minor">
+                <a:schemeClr val="dk1"/>
+              </a:fontRef>
+            </p:style>
+            <p:txBody>
+              <a:bodyPr rtlCol="0" anchor="ctr"/>
+              <a:lstStyle/>
+              <a:p>
+                <a:pPr algn="ctr"/>
+                <a:r>
+                  <a:rPr lang="es-CO" sz="900" dirty="0">
+                    <a:solidFill>
+                      <a:schemeClr val="bg1"/>
+                    </a:solidFill>
+                  </a:rPr>
+                  <a:t>aceleración</a:t>
+                </a:r>
+              </a:p>
+              <a:p>
+                <a:pPr algn="ctr"/>
+                <a:r>
+                  <a:rPr lang="es-CO" sz="900" dirty="0">
+                    <a:solidFill>
+                      <a:schemeClr val="bg1"/>
+                    </a:solidFill>
+                  </a:rPr>
+                  <a:t>𝑎 = 𝜔</a:t>
+                </a:r>
+                <a:r>
+                  <a:rPr lang="es-CO" sz="900" baseline="30000" dirty="0">
+                    <a:solidFill>
+                      <a:schemeClr val="bg1"/>
+                    </a:solidFill>
+                  </a:rPr>
+                  <a:t>2</a:t>
+                </a:r>
+                <a:r>
+                  <a:rPr lang="es-CO" sz="900" dirty="0">
+                    <a:solidFill>
+                      <a:schemeClr val="bg1"/>
+                    </a:solidFill>
+                  </a:rPr>
+                  <a:t> 𝐴 𝑐𝑜𝑠⁡</a:t>
+                </a:r>
+                <a14:m>
+                  <m:oMath xmlns:m="http://schemas.openxmlformats.org/officeDocument/2006/math">
+                    <m:d>
+                      <m:dPr>
+                        <m:ctrlPr>
+                          <a:rPr lang="es-CO" sz="900" i="1" dirty="0" smtClean="0">
+                            <a:solidFill>
+                              <a:schemeClr val="bg1"/>
+                            </a:solidFill>
+                            <a:latin typeface="Cambria Math" panose="02040503050406030204" pitchFamily="18" charset="0"/>
+                          </a:rPr>
+                        </m:ctrlPr>
+                      </m:dPr>
+                      <m:e>
+                        <m:f>
+                          <m:fPr>
+                            <m:ctrlPr>
+                              <a:rPr lang="es-CO" sz="900" i="1" dirty="0">
+                                <a:solidFill>
+                                  <a:schemeClr val="bg1"/>
+                                </a:solidFill>
+                                <a:latin typeface="Cambria Math" panose="02040503050406030204" pitchFamily="18" charset="0"/>
+                              </a:rPr>
+                            </m:ctrlPr>
+                          </m:fPr>
+                          <m:num>
+                            <m:r>
+                              <m:rPr>
+                                <m:nor/>
+                              </m:rPr>
+                              <a:rPr lang="es-CO" sz="900" dirty="0">
+                                <a:solidFill>
+                                  <a:schemeClr val="bg1"/>
+                                </a:solidFill>
+                              </a:rPr>
+                              <m:t>2</m:t>
+                            </m:r>
+                            <m:r>
+                              <m:rPr>
+                                <m:nor/>
+                              </m:rPr>
+                              <a:rPr lang="es-CO" sz="900" dirty="0">
+                                <a:solidFill>
+                                  <a:schemeClr val="bg1"/>
+                                </a:solidFill>
+                              </a:rPr>
+                              <m:t>𝜋</m:t>
+                            </m:r>
+                          </m:num>
+                          <m:den>
+                            <m:r>
+                              <m:rPr>
+                                <m:nor/>
+                              </m:rPr>
+                              <a:rPr lang="es-CO" sz="900" dirty="0">
+                                <a:solidFill>
+                                  <a:schemeClr val="bg1"/>
+                                </a:solidFill>
+                              </a:rPr>
+                              <m:t>𝑇</m:t>
+                            </m:r>
+                          </m:den>
+                        </m:f>
+                        <m:r>
+                          <a:rPr lang="es-CO" sz="900" b="0" i="1" dirty="0" smtClean="0">
+                            <a:solidFill>
+                              <a:schemeClr val="bg1"/>
+                            </a:solidFill>
+                            <a:latin typeface="Cambria Math" panose="02040503050406030204" pitchFamily="18" charset="0"/>
+                          </a:rPr>
+                          <m:t> </m:t>
+                        </m:r>
+                        <m:r>
+                          <a:rPr lang="es-CO" sz="900" b="0" i="1" dirty="0" smtClean="0">
+                            <a:solidFill>
+                              <a:schemeClr val="bg1"/>
+                            </a:solidFill>
+                            <a:latin typeface="Cambria Math" panose="02040503050406030204" pitchFamily="18" charset="0"/>
+                            <a:ea typeface="Cambria Math" panose="02040503050406030204" pitchFamily="18" charset="0"/>
+                          </a:rPr>
+                          <m:t>∙</m:t>
+                        </m:r>
+                        <m:r>
+                          <a:rPr lang="es-CO" sz="900" b="0" i="1" dirty="0" smtClean="0">
+                            <a:solidFill>
+                              <a:schemeClr val="bg1"/>
+                            </a:solidFill>
+                            <a:latin typeface="Cambria Math" panose="02040503050406030204" pitchFamily="18" charset="0"/>
+                            <a:ea typeface="Cambria Math" panose="02040503050406030204" pitchFamily="18" charset="0"/>
+                          </a:rPr>
+                          <m:t>𝑡</m:t>
+                        </m:r>
+                      </m:e>
+                    </m:d>
+                  </m:oMath>
+                </a14:m>
+                <a:endParaRPr lang="es-CO" sz="900" dirty="0">
+                  <a:solidFill>
+                    <a:schemeClr val="bg1"/>
+                  </a:solidFill>
+                </a:endParaRPr>
+              </a:p>
+            </p:txBody>
+          </p:sp>
+        </mc:Choice>
+        <mc:Fallback>
+          <p:sp>
+            <p:nvSpPr>
+              <p:cNvPr id="141" name="Rectángulo 140"/>
+              <p:cNvSpPr>
+                <a:spLocks noRot="1" noChangeAspect="1" noMove="1" noResize="1" noEditPoints="1" noAdjustHandles="1" noChangeArrowheads="1" noChangeShapeType="1" noTextEdit="1"/>
+              </p:cNvSpPr>
+              <p:nvPr/>
+            </p:nvSpPr>
+            <p:spPr>
+              <a:xfrm>
+                <a:off x="7481880" y="2481157"/>
+                <a:ext cx="1246573" cy="562595"/>
+              </a:xfrm>
+              <a:prstGeom prst="rect">
+                <a:avLst/>
+              </a:prstGeom>
+              <a:blipFill>
+                <a:blip r:embed="rId5"/>
+                <a:stretch>
+                  <a:fillRect/>
+                </a:stretch>
+              </a:blipFill>
+              <a:ln>
                 <a:solidFill>
-                  <a:schemeClr val="bg1"/>
+                  <a:srgbClr val="FF0000"/>
                 </a:solidFill>
-              </a:rPr>
-              <a:t>celeración</a:t>
-            </a:r>
-            <a:endParaRPr lang="es-CO" sz="900" dirty="0">
-              <a:solidFill>
-                <a:schemeClr val="bg1"/>
-              </a:solidFill>
-            </a:endParaRPr>
-          </a:p>
-          <a:p>
-            <a:pPr algn="ctr"/>
-            <a:r>
-              <a:rPr lang="es-CO" sz="900" dirty="0">
-                <a:solidFill>
-                  <a:schemeClr val="bg1"/>
-                </a:solidFill>
-              </a:rPr>
-              <a:t>𝑎=𝜔^2 𝐴 𝑐𝑜𝑠⁡[(2𝜋/𝑇)𝑡]</a:t>
-            </a:r>
-          </a:p>
-        </p:txBody>
-      </p:sp>
+              </a:ln>
+            </p:spPr>
+            <p:txBody>
+              <a:bodyPr/>
+              <a:lstStyle/>
+              <a:p>
+                <a:r>
+                  <a:rPr lang="es-CO">
+                    <a:noFill/>
+                  </a:rPr>
+                  <a:t> </a:t>
+                </a:r>
+              </a:p>
+            </p:txBody>
+          </p:sp>
+        </mc:Fallback>
+      </mc:AlternateContent>
       <p:cxnSp>
         <p:nvCxnSpPr>
           <p:cNvPr id="162" name="Conector angular 161"/>
@@ -3093,8 +3438,8 @@
         </p:nvCxnSpPr>
         <p:spPr>
           <a:xfrm rot="5400000">
-            <a:off x="4431157" y="4276067"/>
-            <a:ext cx="577833" cy="611568"/>
+            <a:off x="4520130" y="4318554"/>
+            <a:ext cx="560678" cy="543751"/>
           </a:xfrm>
           <a:prstGeom prst="bentConnector3">
             <a:avLst>
@@ -3130,7 +3475,7 @@
         </p:nvSpPr>
         <p:spPr>
           <a:xfrm>
-            <a:off x="5598855" y="4870768"/>
+            <a:off x="5713159" y="4870768"/>
             <a:ext cx="1041607" cy="528910"/>
           </a:xfrm>
           <a:prstGeom prst="rect">
@@ -3184,8 +3529,8 @@
         </p:nvCxnSpPr>
         <p:spPr>
           <a:xfrm rot="16200000" flipH="1">
-            <a:off x="5283842" y="4034950"/>
-            <a:ext cx="577833" cy="1093802"/>
+            <a:off x="5372814" y="4009619"/>
+            <a:ext cx="560678" cy="1161619"/>
           </a:xfrm>
           <a:prstGeom prst="bentConnector3">
             <a:avLst>
@@ -3221,7 +3566,7 @@
         </p:nvSpPr>
         <p:spPr>
           <a:xfrm>
-            <a:off x="5798104" y="5557498"/>
+            <a:off x="5912408" y="5557498"/>
             <a:ext cx="651140" cy="230832"/>
           </a:xfrm>
           <a:prstGeom prst="rect">
@@ -3252,7 +3597,7 @@
         </p:nvCxnSpPr>
         <p:spPr>
           <a:xfrm rot="5400000">
-            <a:off x="5799749" y="5616987"/>
+            <a:off x="5914053" y="5616987"/>
             <a:ext cx="152582" cy="495268"/>
           </a:xfrm>
           <a:prstGeom prst="bentConnector3">
@@ -3292,7 +3637,7 @@
         </p:nvCxnSpPr>
         <p:spPr>
           <a:xfrm rot="16200000" flipH="1">
-            <a:off x="6384726" y="5527277"/>
+            <a:off x="6499030" y="5527277"/>
             <a:ext cx="152583" cy="674687"/>
           </a:xfrm>
           <a:prstGeom prst="bentConnector3">
@@ -3329,7 +3674,7 @@
         </p:nvSpPr>
         <p:spPr>
           <a:xfrm>
-            <a:off x="6284651" y="5940913"/>
+            <a:off x="6398955" y="5940913"/>
             <a:ext cx="1027420" cy="629357"/>
           </a:xfrm>
           <a:prstGeom prst="rect">
@@ -3369,7 +3714,15 @@
             <a:pPr algn="ctr"/>
             <a:r>
               <a:rPr lang="es-CO" sz="900" dirty="0"/>
-              <a:t>𝐸(𝑃𝑔 )=𝑚𝑔ℎ</a:t>
+              <a:t>𝐸</a:t>
+            </a:r>
+            <a:r>
+              <a:rPr lang="es-CO" sz="900" baseline="-25000" dirty="0"/>
+              <a:t>𝑃𝑔</a:t>
+            </a:r>
+            <a:r>
+              <a:rPr lang="es-CO" sz="900" dirty="0"/>
+              <a:t>=𝑚𝑔ℎ</a:t>
             </a:r>
           </a:p>
         </p:txBody>
@@ -3503,55 +3856,8 @@
         </p:nvSpPr>
         <p:spPr>
           <a:xfrm>
-            <a:off x="1761807" y="5724088"/>
+            <a:off x="1692649" y="5630883"/>
             <a:ext cx="647332" cy="389431"/>
-          </a:xfrm>
-          <a:prstGeom prst="rect">
-            <a:avLst/>
-          </a:prstGeom>
-          <a:ln>
-            <a:solidFill>
-              <a:srgbClr val="FF0000"/>
-            </a:solidFill>
-          </a:ln>
-        </p:spPr>
-        <p:style>
-          <a:lnRef idx="2">
-            <a:schemeClr val="dk1"/>
-          </a:lnRef>
-          <a:fillRef idx="1">
-            <a:schemeClr val="lt1"/>
-          </a:fillRef>
-          <a:effectRef idx="0">
-            <a:schemeClr val="dk1"/>
-          </a:effectRef>
-          <a:fontRef idx="minor">
-            <a:schemeClr val="dk1"/>
-          </a:fontRef>
-        </p:style>
-        <p:txBody>
-          <a:bodyPr rtlCol="0" anchor="ctr"/>
-          <a:lstStyle/>
-          <a:p>
-            <a:pPr algn="ctr"/>
-            <a:r>
-              <a:rPr lang="es-CO" sz="900"/>
-              <a:t>𝐹=−𝑘𝑥</a:t>
-            </a:r>
-            <a:endParaRPr lang="es-CO" sz="900" dirty="0"/>
-          </a:p>
-        </p:txBody>
-      </p:sp>
-      <p:sp>
-        <p:nvSpPr>
-          <p:cNvPr id="226" name="Rectángulo 225"/>
-          <p:cNvSpPr/>
-          <p:nvPr/>
-        </p:nvSpPr>
-        <p:spPr>
-          <a:xfrm>
-            <a:off x="2815630" y="5724088"/>
-            <a:ext cx="824024" cy="382718"/>
           </a:xfrm>
           <a:prstGeom prst="rect">
             <a:avLst/>
@@ -3583,7 +3889,53 @@
             <a:pPr algn="ctr"/>
             <a:r>
               <a:rPr lang="es-CO" sz="900" dirty="0"/>
-              <a:t>𝐹=𝑚𝑔 sin⁡𝜃</a:t>
+              <a:t>𝐹 = −𝑘𝑥</a:t>
+            </a:r>
+          </a:p>
+        </p:txBody>
+      </p:sp>
+      <p:sp>
+        <p:nvSpPr>
+          <p:cNvPr id="226" name="Rectángulo 225"/>
+          <p:cNvSpPr/>
+          <p:nvPr/>
+        </p:nvSpPr>
+        <p:spPr>
+          <a:xfrm>
+            <a:off x="2815630" y="5724088"/>
+            <a:ext cx="824024" cy="382718"/>
+          </a:xfrm>
+          <a:prstGeom prst="rect">
+            <a:avLst/>
+          </a:prstGeom>
+          <a:ln>
+            <a:solidFill>
+              <a:srgbClr val="FF0000"/>
+            </a:solidFill>
+          </a:ln>
+        </p:spPr>
+        <p:style>
+          <a:lnRef idx="2">
+            <a:schemeClr val="dk1"/>
+          </a:lnRef>
+          <a:fillRef idx="1">
+            <a:schemeClr val="lt1"/>
+          </a:fillRef>
+          <a:effectRef idx="0">
+            <a:schemeClr val="dk1"/>
+          </a:effectRef>
+          <a:fontRef idx="minor">
+            <a:schemeClr val="dk1"/>
+          </a:fontRef>
+        </p:style>
+        <p:txBody>
+          <a:bodyPr rtlCol="0" anchor="ctr"/>
+          <a:lstStyle/>
+          <a:p>
+            <a:pPr algn="ctr"/>
+            <a:r>
+              <a:rPr lang="es-CO" sz="900" dirty="0"/>
+              <a:t>𝐹 = 𝑚𝑔 sin⁡𝜃</a:t>
             </a:r>
           </a:p>
         </p:txBody>

</xml_diff>